<commit_message>
presentation: fix font color
</commit_message>
<xml_diff>
--- a/Offline-first SwiftUI aplikacija sa lokalnim keširanjem.pptx
+++ b/Offline-first SwiftUI aplikacija sa lokalnim keširanjem.pptx
@@ -23651,7 +23651,7 @@
             <a:r>
               <a:rPr lang="en" sz="2000">
                 <a:solidFill>
-                  <a:schemeClr val="lt2"/>
+                  <a:schemeClr val="dk2"/>
                 </a:solidFill>
                 <a:latin typeface="Roboto"/>
                 <a:ea typeface="Roboto"/>
@@ -23662,7 +23662,7 @@
             </a:r>
             <a:endParaRPr sz="2000">
               <a:solidFill>
-                <a:schemeClr val="lt2"/>
+                <a:schemeClr val="dk2"/>
               </a:solidFill>
               <a:latin typeface="Roboto"/>
               <a:ea typeface="Roboto"/>
@@ -23679,7 +23679,7 @@
                 <a:spcPts val="0"/>
               </a:spcAft>
               <a:buClr>
-                <a:schemeClr val="lt2"/>
+                <a:schemeClr val="dk2"/>
               </a:buClr>
               <a:buSzPts val="2000"/>
               <a:buFont typeface="Roboto"/>
@@ -23688,7 +23688,7 @@
             <a:r>
               <a:rPr lang="en" sz="2000">
                 <a:solidFill>
-                  <a:schemeClr val="lt2"/>
+                  <a:schemeClr val="dk2"/>
                 </a:solidFill>
                 <a:latin typeface="Roboto"/>
                 <a:ea typeface="Roboto"/>
@@ -23699,7 +23699,7 @@
             </a:r>
             <a:endParaRPr sz="2000">
               <a:solidFill>
-                <a:schemeClr val="lt2"/>
+                <a:schemeClr val="dk2"/>
               </a:solidFill>
               <a:latin typeface="Roboto"/>
               <a:ea typeface="Roboto"/>
@@ -23716,7 +23716,7 @@
                 <a:spcPts val="0"/>
               </a:spcAft>
               <a:buClr>
-                <a:schemeClr val="lt2"/>
+                <a:schemeClr val="dk2"/>
               </a:buClr>
               <a:buSzPts val="2000"/>
               <a:buFont typeface="Roboto"/>
@@ -23725,7 +23725,7 @@
             <a:r>
               <a:rPr lang="en" sz="2000">
                 <a:solidFill>
-                  <a:schemeClr val="lt2"/>
+                  <a:schemeClr val="dk2"/>
                 </a:solidFill>
                 <a:latin typeface="Roboto"/>
                 <a:ea typeface="Roboto"/>
@@ -23736,7 +23736,7 @@
             </a:r>
             <a:endParaRPr sz="2000">
               <a:solidFill>
-                <a:schemeClr val="lt2"/>
+                <a:schemeClr val="dk2"/>
               </a:solidFill>
               <a:latin typeface="Roboto"/>
               <a:ea typeface="Roboto"/>
@@ -23753,7 +23753,7 @@
                 <a:spcPts val="0"/>
               </a:spcAft>
               <a:buClr>
-                <a:schemeClr val="lt2"/>
+                <a:schemeClr val="dk2"/>
               </a:buClr>
               <a:buSzPts val="2000"/>
               <a:buFont typeface="Roboto"/>
@@ -23762,7 +23762,7 @@
             <a:r>
               <a:rPr lang="en" sz="2000">
                 <a:solidFill>
-                  <a:schemeClr val="lt2"/>
+                  <a:schemeClr val="dk2"/>
                 </a:solidFill>
                 <a:latin typeface="Roboto"/>
                 <a:ea typeface="Roboto"/>
@@ -23773,7 +23773,7 @@
             </a:r>
             <a:endParaRPr sz="2000">
               <a:solidFill>
-                <a:schemeClr val="lt2"/>
+                <a:schemeClr val="dk2"/>
               </a:solidFill>
               <a:latin typeface="Roboto"/>
               <a:ea typeface="Roboto"/>
@@ -23790,7 +23790,7 @@
                 <a:spcPts val="0"/>
               </a:spcAft>
               <a:buClr>
-                <a:schemeClr val="lt2"/>
+                <a:schemeClr val="dk2"/>
               </a:buClr>
               <a:buSzPts val="2000"/>
               <a:buFont typeface="Roboto"/>
@@ -23799,7 +23799,7 @@
             <a:r>
               <a:rPr lang="en" sz="2000">
                 <a:solidFill>
-                  <a:schemeClr val="lt2"/>
+                  <a:schemeClr val="dk2"/>
                 </a:solidFill>
                 <a:latin typeface="Roboto"/>
                 <a:ea typeface="Roboto"/>
@@ -23810,7 +23810,7 @@
             </a:r>
             <a:endParaRPr sz="2000">
               <a:solidFill>
-                <a:schemeClr val="lt2"/>
+                <a:schemeClr val="dk2"/>
               </a:solidFill>
               <a:latin typeface="Roboto"/>
               <a:ea typeface="Roboto"/>
@@ -23833,7 +23833,7 @@
             </a:r>
             <a:endParaRPr sz="2000">
               <a:solidFill>
-                <a:schemeClr val="lt2"/>
+                <a:schemeClr val="dk2"/>
               </a:solidFill>
               <a:latin typeface="Roboto"/>
               <a:ea typeface="Roboto"/>
@@ -23854,7 +23854,7 @@
             <a:r>
               <a:rPr lang="en" sz="2000">
                 <a:solidFill>
-                  <a:schemeClr val="lt2"/>
+                  <a:schemeClr val="dk2"/>
                 </a:solidFill>
                 <a:latin typeface="Roboto"/>
                 <a:ea typeface="Roboto"/>
@@ -23865,7 +23865,7 @@
             </a:r>
             <a:endParaRPr sz="2000">
               <a:solidFill>
-                <a:schemeClr val="lt2"/>
+                <a:schemeClr val="dk2"/>
               </a:solidFill>
               <a:latin typeface="Roboto"/>
               <a:ea typeface="Roboto"/>
@@ -23882,7 +23882,7 @@
                 <a:spcPts val="0"/>
               </a:spcAft>
               <a:buClr>
-                <a:schemeClr val="lt2"/>
+                <a:schemeClr val="dk2"/>
               </a:buClr>
               <a:buSzPts val="2000"/>
               <a:buFont typeface="Roboto"/>
@@ -23891,7 +23891,7 @@
             <a:r>
               <a:rPr lang="en" sz="2000">
                 <a:solidFill>
-                  <a:schemeClr val="lt2"/>
+                  <a:schemeClr val="dk2"/>
                 </a:solidFill>
                 <a:latin typeface="Roboto"/>
                 <a:ea typeface="Roboto"/>
@@ -23902,7 +23902,7 @@
             </a:r>
             <a:endParaRPr sz="2000">
               <a:solidFill>
-                <a:schemeClr val="lt2"/>
+                <a:schemeClr val="dk2"/>
               </a:solidFill>
               <a:latin typeface="Roboto"/>
               <a:ea typeface="Roboto"/>
@@ -23919,7 +23919,7 @@
                 <a:spcPts val="0"/>
               </a:spcAft>
               <a:buClr>
-                <a:schemeClr val="lt2"/>
+                <a:schemeClr val="dk2"/>
               </a:buClr>
               <a:buSzPts val="2000"/>
               <a:buFont typeface="Roboto"/>
@@ -23928,7 +23928,7 @@
             <a:r>
               <a:rPr lang="en" sz="2000">
                 <a:solidFill>
-                  <a:schemeClr val="lt2"/>
+                  <a:schemeClr val="dk2"/>
                 </a:solidFill>
                 <a:latin typeface="Roboto"/>
                 <a:ea typeface="Roboto"/>
@@ -23939,7 +23939,7 @@
             </a:r>
             <a:endParaRPr sz="2000">
               <a:solidFill>
-                <a:schemeClr val="lt2"/>
+                <a:schemeClr val="dk2"/>
               </a:solidFill>
               <a:latin typeface="Roboto"/>
               <a:ea typeface="Roboto"/>
@@ -23956,7 +23956,7 @@
                 <a:spcPts val="0"/>
               </a:spcAft>
               <a:buClr>
-                <a:schemeClr val="lt2"/>
+                <a:schemeClr val="dk2"/>
               </a:buClr>
               <a:buSzPts val="2000"/>
               <a:buFont typeface="Roboto"/>
@@ -23965,7 +23965,7 @@
             <a:r>
               <a:rPr lang="en" sz="2000">
                 <a:solidFill>
-                  <a:schemeClr val="lt2"/>
+                  <a:schemeClr val="dk2"/>
                 </a:solidFill>
                 <a:latin typeface="Roboto"/>
                 <a:ea typeface="Roboto"/>
@@ -23976,7 +23976,7 @@
             </a:r>
             <a:endParaRPr sz="2000">
               <a:solidFill>
-                <a:schemeClr val="lt2"/>
+                <a:schemeClr val="dk2"/>
               </a:solidFill>
               <a:latin typeface="Roboto"/>
               <a:ea typeface="Roboto"/>
@@ -23993,7 +23993,7 @@
                 <a:spcPts val="0"/>
               </a:spcAft>
               <a:buClr>
-                <a:schemeClr val="lt2"/>
+                <a:schemeClr val="dk2"/>
               </a:buClr>
               <a:buSzPts val="2000"/>
               <a:buFont typeface="Roboto"/>
@@ -24002,7 +24002,7 @@
             <a:r>
               <a:rPr lang="en" sz="2000">
                 <a:solidFill>
-                  <a:schemeClr val="lt2"/>
+                  <a:schemeClr val="dk2"/>
                 </a:solidFill>
                 <a:latin typeface="Roboto"/>
                 <a:ea typeface="Roboto"/>
@@ -24013,7 +24013,7 @@
             </a:r>
             <a:endParaRPr sz="2000">
               <a:solidFill>
-                <a:schemeClr val="lt2"/>
+                <a:schemeClr val="dk2"/>
               </a:solidFill>
               <a:latin typeface="Roboto"/>
               <a:ea typeface="Roboto"/>
@@ -24635,7 +24635,7 @@
             <a:tbl>
               <a:tblPr>
                 <a:noFill/>
-                <a:tableStyleId>{D1A0CCFF-9251-4D42-8BFA-0C5E26F74129}</a:tableStyleId>
+                <a:tableStyleId>{8F05E373-EAF4-434E-8233-C1A5785A7640}</a:tableStyleId>
               </a:tblPr>
               <a:tblGrid>
                 <a:gridCol w="4432500"/>

</xml_diff>